<commit_message>
AVS 146 Equine quiz finished
</commit_message>
<xml_diff>
--- a/AVS146/20201012_Horselab_AVS146.pptx
+++ b/AVS146/20201012_Horselab_AVS146.pptx
@@ -104,6 +104,11 @@
       </a:defRPr>
     </a:lvl9pPr>
   </p:defaultTextStyle>
+  <p:extLst>
+    <p:ext uri="{EFAFB233-063F-42B5-8137-9DF3F51BA10A}">
+      <p15:sldGuideLst xmlns:p15="http://schemas.microsoft.com/office/powerpoint/2012/main"/>
+    </p:ext>
+  </p:extLst>
 </p:presentation>
 </file>
 
@@ -3005,7 +3010,7 @@
         <p:spPr>
           <a:xfrm>
             <a:off x="535577" y="666200"/>
-            <a:ext cx="5969726" cy="8679299"/>
+            <a:ext cx="5969726" cy="8402300"/>
           </a:xfrm>
           <a:prstGeom prst="rect">
             <a:avLst/>
@@ -3148,8 +3153,21 @@
           <a:p>
             <a:r>
               <a:rPr lang="en-US" dirty="0" smtClean="0"/>
-              <a:t>A horse may be identified using white markings such as star, strip, snip, scars, leg markings, and brands (Standardbreds are branded on the right side of the neck.)</a:t>
-            </a:r>
+              <a:t>A horse may be identified using white markings such as star, strip, snip, scars, leg markings, and </a:t>
+            </a:r>
+            <a:r>
+              <a:rPr lang="en-US" dirty="0" smtClean="0"/>
+              <a:t>brands. Some have primitive markings e.g.</a:t>
+            </a:r>
+            <a:r>
+              <a:rPr lang="en-US" dirty="0" smtClean="0"/>
+              <a:t> dorsal stripe and cross on </a:t>
+            </a:r>
+            <a:r>
+              <a:rPr lang="en-US" smtClean="0"/>
+              <a:t>the back.</a:t>
+            </a:r>
+            <a:endParaRPr lang="en-US" dirty="0" smtClean="0"/>
           </a:p>
           <a:p>
             <a:endParaRPr lang="en-US" dirty="0"/>
@@ -3171,11 +3189,7 @@
             </a:r>
             <a:r>
               <a:rPr lang="en-US" dirty="0" smtClean="0"/>
-              <a:t> ½, </a:t>
-            </a:r>
-            <a:r>
-              <a:rPr lang="en-US" dirty="0" smtClean="0"/>
-              <a:t>3 ½, and 4 ½ years of age. </a:t>
+              <a:t> ½, 3 ½, and 4 ½ years of age. </a:t>
             </a:r>
           </a:p>
         </p:txBody>

</xml_diff>